<commit_message>
Updated Chroma Key presentations
</commit_message>
<xml_diff>
--- a/public/download/slides-louvor-fundo-verde-16x9.pptx
+++ b/public/download/slides-louvor-fundo-verde-16x9.pptx
@@ -356,7 +356,9 @@
           </a:prstGeom>
         </p:spPr>
         <p:txBody>
-          <a:bodyPr anchor="b"/>
+          <a:bodyPr anchor="b">
+            <a:noAutofit/>
+          </a:bodyPr>
           <a:lstStyle>
             <a:lvl1pPr marL="0" indent="0" algn="ctr">
               <a:buNone/>
@@ -412,13 +414,13 @@
         </p:nvSpPr>
         <p:spPr>
           <a:xfrm>
-            <a:off x="189470" y="5284319"/>
+            <a:off x="189470" y="5393094"/>
             <a:ext cx="11813060" cy="877077"/>
           </a:xfrm>
         </p:spPr>
         <p:txBody>
           <a:bodyPr>
-            <a:normAutofit/>
+            <a:noAutofit/>
           </a:bodyPr>
           <a:lstStyle>
             <a:lvl1pPr>
@@ -480,7 +482,7 @@
             <a:spLocks noGrp="1"/>
           </p:cNvSpPr>
           <p:nvPr>
-            <p:ph type="title"/>
+            <p:ph type="title" hasCustomPrompt="1"/>
           </p:nvPr>
         </p:nvSpPr>
         <p:spPr>
@@ -494,7 +496,7 @@
         </p:spPr>
         <p:txBody>
           <a:bodyPr vert="horz" lIns="91440" tIns="45720" rIns="91440" bIns="45720" rtlCol="0" anchor="b">
-            <a:normAutofit/>
+            <a:noAutofit/>
           </a:bodyPr>
           <a:lstStyle/>
           <a:p>

</xml_diff>